<commit_message>
eMail for Outlook, Blockchain changes
</commit_message>
<xml_diff>
--- a/The Future of BlockchainV2.pptx
+++ b/The Future of BlockchainV2.pptx
@@ -5,29 +5,28 @@
     <p:sldMasterId id="2147483750" r:id="rId1"/>
   </p:sldMasterIdLst>
   <p:notesMasterIdLst>
-    <p:notesMasterId r:id="rId22"/>
+    <p:notesMasterId r:id="rId21"/>
   </p:notesMasterIdLst>
   <p:sldIdLst>
     <p:sldId id="256" r:id="rId2"/>
-    <p:sldId id="257" r:id="rId3"/>
-    <p:sldId id="269" r:id="rId4"/>
-    <p:sldId id="275" r:id="rId5"/>
-    <p:sldId id="270" r:id="rId6"/>
-    <p:sldId id="271" r:id="rId7"/>
-    <p:sldId id="272" r:id="rId8"/>
-    <p:sldId id="273" r:id="rId9"/>
-    <p:sldId id="274" r:id="rId10"/>
-    <p:sldId id="259" r:id="rId11"/>
-    <p:sldId id="260" r:id="rId12"/>
-    <p:sldId id="261" r:id="rId13"/>
-    <p:sldId id="258" r:id="rId14"/>
-    <p:sldId id="265" r:id="rId15"/>
-    <p:sldId id="266" r:id="rId16"/>
-    <p:sldId id="267" r:id="rId17"/>
-    <p:sldId id="276" r:id="rId18"/>
-    <p:sldId id="262" r:id="rId19"/>
-    <p:sldId id="264" r:id="rId20"/>
-    <p:sldId id="268" r:id="rId21"/>
+    <p:sldId id="269" r:id="rId3"/>
+    <p:sldId id="275" r:id="rId4"/>
+    <p:sldId id="270" r:id="rId5"/>
+    <p:sldId id="271" r:id="rId6"/>
+    <p:sldId id="272" r:id="rId7"/>
+    <p:sldId id="273" r:id="rId8"/>
+    <p:sldId id="274" r:id="rId9"/>
+    <p:sldId id="259" r:id="rId10"/>
+    <p:sldId id="260" r:id="rId11"/>
+    <p:sldId id="261" r:id="rId12"/>
+    <p:sldId id="258" r:id="rId13"/>
+    <p:sldId id="265" r:id="rId14"/>
+    <p:sldId id="266" r:id="rId15"/>
+    <p:sldId id="267" r:id="rId16"/>
+    <p:sldId id="276" r:id="rId17"/>
+    <p:sldId id="262" r:id="rId18"/>
+    <p:sldId id="264" r:id="rId19"/>
+    <p:sldId id="268" r:id="rId20"/>
   </p:sldIdLst>
   <p:sldSz cx="12192000" cy="6858000"/>
   <p:notesSz cx="6858000" cy="9144000"/>
@@ -132,7 +131,6 @@
         <p14:section name="Default Section" id="{F6A5B683-F9E7-4D45-9233-0BAE688C1117}">
           <p14:sldIdLst>
             <p14:sldId id="256"/>
-            <p14:sldId id="257"/>
             <p14:sldId id="269"/>
             <p14:sldId id="275"/>
             <p14:sldId id="270"/>
@@ -9682,7 +9680,7 @@
           <a:p>
             <a:fld id="{F454D6B2-E810-4A64-9BA8-55BC563FD3C6}" type="datetimeFigureOut">
               <a:rPr lang="en-US" smtClean="0"/>
-              <a:t>4/24/2022</a:t>
+              <a:t>4/25/2022</a:t>
             </a:fld>
             <a:endParaRPr lang="en-US"/>
           </a:p>
@@ -10031,7 +10029,7 @@
           <a:p>
             <a:fld id="{CA2FFBD6-4966-4938-9437-AAC1CC38B222}" type="slidenum">
               <a:rPr lang="en-US" smtClean="0"/>
-              <a:t>8</a:t>
+              <a:t>7</a:t>
             </a:fld>
             <a:endParaRPr lang="en-US"/>
           </a:p>
@@ -10134,7 +10132,7 @@
           <a:p>
             <a:fld id="{CA2FFBD6-4966-4938-9437-AAC1CC38B222}" type="slidenum">
               <a:rPr lang="en-US" smtClean="0"/>
-              <a:t>13</a:t>
+              <a:t>12</a:t>
             </a:fld>
             <a:endParaRPr lang="en-US"/>
           </a:p>
@@ -10382,7 +10380,7 @@
           <a:p>
             <a:fld id="{4F8EDF7F-3C73-4429-B464-79D52963A752}" type="datetime1">
               <a:rPr lang="en-US" smtClean="0"/>
-              <a:t>4/24/2022</a:t>
+              <a:t>4/25/2022</a:t>
             </a:fld>
             <a:endParaRPr lang="en-US"/>
           </a:p>
@@ -10716,7 +10714,7 @@
           <a:p>
             <a:fld id="{3B0DC6D4-4E53-481A-86E5-1D77B4A868E9}" type="datetime1">
               <a:rPr lang="en-US" smtClean="0"/>
-              <a:t>4/24/2022</a:t>
+              <a:t>4/25/2022</a:t>
             </a:fld>
             <a:endParaRPr lang="en-US"/>
           </a:p>
@@ -10995,7 +10993,7 @@
           <a:p>
             <a:fld id="{3B0DC6D4-4E53-481A-86E5-1D77B4A868E9}" type="datetime1">
               <a:rPr lang="en-US" smtClean="0"/>
-              <a:t>4/24/2022</a:t>
+              <a:t>4/25/2022</a:t>
             </a:fld>
             <a:endParaRPr lang="en-US"/>
           </a:p>
@@ -11564,7 +11562,7 @@
           <a:p>
             <a:fld id="{3B0DC6D4-4E53-481A-86E5-1D77B4A868E9}" type="datetime1">
               <a:rPr lang="en-US" smtClean="0"/>
-              <a:t>4/24/2022</a:t>
+              <a:t>4/25/2022</a:t>
             </a:fld>
             <a:endParaRPr lang="en-US"/>
           </a:p>
@@ -11843,7 +11841,7 @@
           <a:p>
             <a:fld id="{3B0DC6D4-4E53-481A-86E5-1D77B4A868E9}" type="datetime1">
               <a:rPr lang="en-US" smtClean="0"/>
-              <a:t>4/24/2022</a:t>
+              <a:t>4/25/2022</a:t>
             </a:fld>
             <a:endParaRPr lang="en-US"/>
           </a:p>
@@ -12406,7 +12404,7 @@
           <a:p>
             <a:fld id="{3B0DC6D4-4E53-481A-86E5-1D77B4A868E9}" type="datetime1">
               <a:rPr lang="en-US" smtClean="0"/>
-              <a:t>4/24/2022</a:t>
+              <a:t>4/25/2022</a:t>
             </a:fld>
             <a:endParaRPr lang="en-US"/>
           </a:p>
@@ -12734,7 +12732,7 @@
           <a:p>
             <a:fld id="{3B0DC6D4-4E53-481A-86E5-1D77B4A868E9}" type="datetime1">
               <a:rPr lang="en-US" smtClean="0"/>
-              <a:t>4/24/2022</a:t>
+              <a:t>4/25/2022</a:t>
             </a:fld>
             <a:endParaRPr lang="en-US"/>
           </a:p>
@@ -12940,7 +12938,7 @@
           <a:p>
             <a:fld id="{EE035E90-96D2-40CA-9D8B-9E9465D75337}" type="datetime1">
               <a:rPr lang="en-US" smtClean="0"/>
-              <a:t>4/24/2022</a:t>
+              <a:t>4/25/2022</a:t>
             </a:fld>
             <a:endParaRPr lang="en-US"/>
           </a:p>
@@ -13150,7 +13148,7 @@
           <a:p>
             <a:fld id="{5C5DB4C3-0EF1-4435-B19E-AA9670EC8C3B}" type="datetime1">
               <a:rPr lang="en-US" smtClean="0"/>
-              <a:t>4/24/2022</a:t>
+              <a:t>4/25/2022</a:t>
             </a:fld>
             <a:endParaRPr lang="en-US"/>
           </a:p>
@@ -13359,7 +13357,7 @@
           <a:p>
             <a:fld id="{1477705E-35F6-417F-8841-D90D9E346D4B}" type="datetime1">
               <a:rPr lang="en-US" smtClean="0"/>
-              <a:t>4/24/2022</a:t>
+              <a:t>4/25/2022</a:t>
             </a:fld>
             <a:endParaRPr lang="en-US"/>
           </a:p>
@@ -13635,7 +13633,7 @@
           <a:p>
             <a:fld id="{66B2BD42-3099-45BB-8076-FE7AF5B78CA6}" type="datetime1">
               <a:rPr lang="en-US" smtClean="0"/>
-              <a:t>4/24/2022</a:t>
+              <a:t>4/25/2022</a:t>
             </a:fld>
             <a:endParaRPr lang="en-US"/>
           </a:p>
@@ -13901,7 +13899,7 @@
           <a:p>
             <a:fld id="{36E2F4DA-F9C8-4357-8FAD-49ADC378FC2A}" type="datetime1">
               <a:rPr lang="en-US" smtClean="0"/>
-              <a:t>4/24/2022</a:t>
+              <a:t>4/25/2022</a:t>
             </a:fld>
             <a:endParaRPr lang="en-US"/>
           </a:p>
@@ -14275,7 +14273,7 @@
           <a:p>
             <a:fld id="{2BE090A4-E75F-43ED-8F86-52E099C428B0}" type="datetime1">
               <a:rPr lang="en-US" smtClean="0"/>
-              <a:t>4/24/2022</a:t>
+              <a:t>4/25/2022</a:t>
             </a:fld>
             <a:endParaRPr lang="en-US"/>
           </a:p>
@@ -14427,7 +14425,7 @@
           <a:p>
             <a:fld id="{1BB3AA94-7768-466F-AFE5-AC0867708B21}" type="datetime1">
               <a:rPr lang="en-US" smtClean="0"/>
-              <a:t>4/24/2022</a:t>
+              <a:t>4/25/2022</a:t>
             </a:fld>
             <a:endParaRPr lang="en-US"/>
           </a:p>
@@ -14552,7 +14550,7 @@
           <a:p>
             <a:fld id="{E75AC77C-7F72-4E0B-A755-36BF25B93E9C}" type="datetime1">
               <a:rPr lang="en-US" smtClean="0"/>
-              <a:t>4/24/2022</a:t>
+              <a:t>4/25/2022</a:t>
             </a:fld>
             <a:endParaRPr lang="en-US"/>
           </a:p>
@@ -14837,7 +14835,7 @@
           <a:p>
             <a:fld id="{A62DE8C4-7B44-4195-A968-F147A766EF9D}" type="datetime1">
               <a:rPr lang="en-US" smtClean="0"/>
-              <a:t>4/24/2022</a:t>
+              <a:t>4/25/2022</a:t>
             </a:fld>
             <a:endParaRPr lang="en-US"/>
           </a:p>
@@ -15161,7 +15159,7 @@
           <a:p>
             <a:fld id="{E93109BB-C69E-4330-A092-CC926DC30BC2}" type="datetime1">
               <a:rPr lang="en-US" smtClean="0"/>
-              <a:t>4/24/2022</a:t>
+              <a:t>4/25/2022</a:t>
             </a:fld>
             <a:endParaRPr lang="en-US"/>
           </a:p>
@@ -15375,7 +15373,7 @@
           <a:p>
             <a:fld id="{3B0DC6D4-4E53-481A-86E5-1D77B4A868E9}" type="datetime1">
               <a:rPr lang="en-US" smtClean="0"/>
-              <a:t>4/24/2022</a:t>
+              <a:t>4/25/2022</a:t>
             </a:fld>
             <a:endParaRPr lang="en-US"/>
           </a:p>
@@ -15912,7 +15910,7 @@
           <a:p>
             <a:r>
               <a:rPr lang="en-US" dirty="0"/>
-              <a:t>The Future of Blockchain</a:t>
+              <a:t>Future of Blockchain</a:t>
             </a:r>
           </a:p>
         </p:txBody>
@@ -15984,171 +15982,6 @@
 </file>
 
 <file path=ppt/slides/slide10.xml><?xml version="1.0" encoding="utf-8"?>
-<p:sld xmlns:a="http://schemas.openxmlformats.org/drawingml/2006/main" xmlns:r="http://schemas.openxmlformats.org/officeDocument/2006/relationships" xmlns:p="http://schemas.openxmlformats.org/presentationml/2006/main">
-  <p:cSld>
-    <p:spTree>
-      <p:nvGrpSpPr>
-        <p:cNvPr id="1" name=""/>
-        <p:cNvGrpSpPr/>
-        <p:nvPr/>
-      </p:nvGrpSpPr>
-      <p:grpSpPr>
-        <a:xfrm>
-          <a:off x="0" y="0"/>
-          <a:ext cx="0" cy="0"/>
-          <a:chOff x="0" y="0"/>
-          <a:chExt cx="0" cy="0"/>
-        </a:xfrm>
-      </p:grpSpPr>
-      <p:sp>
-        <p:nvSpPr>
-          <p:cNvPr id="2" name="Title 1">
-            <a:extLst>
-              <a:ext uri="{FF2B5EF4-FFF2-40B4-BE49-F238E27FC236}">
-                <a16:creationId xmlns:a16="http://schemas.microsoft.com/office/drawing/2014/main" id="{2F8CA95A-2352-4C3C-BB2F-0AF30A641769}"/>
-              </a:ext>
-            </a:extLst>
-          </p:cNvPr>
-          <p:cNvSpPr>
-            <a:spLocks noGrp="1"/>
-          </p:cNvSpPr>
-          <p:nvPr>
-            <p:ph type="title"/>
-          </p:nvPr>
-        </p:nvSpPr>
-        <p:spPr>
-          <a:xfrm>
-            <a:off x="685801" y="383400"/>
-            <a:ext cx="10131425" cy="696686"/>
-          </a:xfrm>
-        </p:spPr>
-        <p:txBody>
-          <a:bodyPr/>
-          <a:lstStyle/>
-          <a:p>
-            <a:r>
-              <a:rPr lang="en-US" dirty="0"/>
-              <a:t>General concept of Blockchain</a:t>
-            </a:r>
-          </a:p>
-        </p:txBody>
-      </p:sp>
-      <p:sp>
-        <p:nvSpPr>
-          <p:cNvPr id="3" name="Content Placeholder 2">
-            <a:extLst>
-              <a:ext uri="{FF2B5EF4-FFF2-40B4-BE49-F238E27FC236}">
-                <a16:creationId xmlns:a16="http://schemas.microsoft.com/office/drawing/2014/main" id="{86A14F35-5599-4413-9392-55743DACF57D}"/>
-              </a:ext>
-            </a:extLst>
-          </p:cNvPr>
-          <p:cNvSpPr>
-            <a:spLocks noGrp="1"/>
-          </p:cNvSpPr>
-          <p:nvPr>
-            <p:ph idx="1"/>
-          </p:nvPr>
-        </p:nvSpPr>
-        <p:spPr>
-          <a:xfrm>
-            <a:off x="685801" y="1080087"/>
-            <a:ext cx="10131425" cy="563184"/>
-          </a:xfrm>
-        </p:spPr>
-        <p:txBody>
-          <a:bodyPr/>
-          <a:lstStyle/>
-          <a:p>
-            <a:r>
-              <a:rPr lang="en-US" dirty="0"/>
-              <a:t>Blockchain is a type of Distributed Ledger Technology</a:t>
-            </a:r>
-          </a:p>
-        </p:txBody>
-      </p:sp>
-      <p:sp>
-        <p:nvSpPr>
-          <p:cNvPr id="4" name="Footer Placeholder 3">
-            <a:extLst>
-              <a:ext uri="{FF2B5EF4-FFF2-40B4-BE49-F238E27FC236}">
-                <a16:creationId xmlns:a16="http://schemas.microsoft.com/office/drawing/2014/main" id="{EFF3A170-42A2-4531-9696-ED1A545EFE91}"/>
-              </a:ext>
-            </a:extLst>
-          </p:cNvPr>
-          <p:cNvSpPr>
-            <a:spLocks noGrp="1"/>
-          </p:cNvSpPr>
-          <p:nvPr>
-            <p:ph type="ftr" sz="quarter" idx="11"/>
-          </p:nvPr>
-        </p:nvSpPr>
-        <p:spPr>
-          <a:xfrm>
-            <a:off x="449451" y="6356350"/>
-            <a:ext cx="11251769" cy="365125"/>
-          </a:xfrm>
-        </p:spPr>
-        <p:txBody>
-          <a:bodyPr/>
-          <a:lstStyle/>
-          <a:p>
-            <a:r>
-              <a:rPr lang="en-US" dirty="0"/>
-              <a:t>https://www.euromoney.com/learning/blockchain-explained/what-is-blockchain</a:t>
-            </a:r>
-          </a:p>
-        </p:txBody>
-      </p:sp>
-      <p:pic>
-        <p:nvPicPr>
-          <p:cNvPr id="6" name="Picture 5">
-            <a:extLst>
-              <a:ext uri="{FF2B5EF4-FFF2-40B4-BE49-F238E27FC236}">
-                <a16:creationId xmlns:a16="http://schemas.microsoft.com/office/drawing/2014/main" id="{EBAD2DA8-7E8C-4B26-8951-72846578A0AE}"/>
-              </a:ext>
-            </a:extLst>
-          </p:cNvPr>
-          <p:cNvPicPr>
-            <a:picLocks noChangeAspect="1"/>
-          </p:cNvPicPr>
-          <p:nvPr/>
-        </p:nvPicPr>
-        <p:blipFill>
-          <a:blip r:embed="rId2">
-            <a:extLst>
-              <a:ext uri="{28A0092B-C50C-407E-A947-70E740481C1C}">
-                <a14:useLocalDpi xmlns:a14="http://schemas.microsoft.com/office/drawing/2010/main" val="0"/>
-              </a:ext>
-            </a:extLst>
-          </a:blip>
-          <a:stretch>
-            <a:fillRect/>
-          </a:stretch>
-        </p:blipFill>
-        <p:spPr>
-          <a:xfrm>
-            <a:off x="2366053" y="1815549"/>
-            <a:ext cx="6607466" cy="4129666"/>
-          </a:xfrm>
-          <a:prstGeom prst="rect">
-            <a:avLst/>
-          </a:prstGeom>
-        </p:spPr>
-      </p:pic>
-    </p:spTree>
-    <p:extLst>
-      <p:ext uri="{BB962C8B-B14F-4D97-AF65-F5344CB8AC3E}">
-        <p14:creationId xmlns:p14="http://schemas.microsoft.com/office/powerpoint/2010/main" val="3561977040"/>
-      </p:ext>
-    </p:extLst>
-  </p:cSld>
-  <p:clrMapOvr>
-    <a:masterClrMapping/>
-  </p:clrMapOvr>
-</p:sld>
-</file>
-
-<file path=ppt/slides/slide11.xml><?xml version="1.0" encoding="utf-8"?>
 <p:sld xmlns:a="http://schemas.openxmlformats.org/drawingml/2006/main" xmlns:r="http://schemas.openxmlformats.org/officeDocument/2006/relationships" xmlns:p="http://schemas.openxmlformats.org/presentationml/2006/main">
   <p:cSld>
     <p:spTree>
@@ -16281,7 +16114,7 @@
 </p:sld>
 </file>
 
-<file path=ppt/slides/slide12.xml><?xml version="1.0" encoding="utf-8"?>
+<file path=ppt/slides/slide11.xml><?xml version="1.0" encoding="utf-8"?>
 <p:sld xmlns:a="http://schemas.openxmlformats.org/drawingml/2006/main" xmlns:r="http://schemas.openxmlformats.org/officeDocument/2006/relationships" xmlns:p="http://schemas.openxmlformats.org/presentationml/2006/main">
   <p:cSld>
     <p:spTree>
@@ -16321,7 +16154,7 @@
           <a:p>
             <a:r>
               <a:rPr lang="en-US" dirty="0"/>
-              <a:t>Common uses of Blockchain</a:t>
+              <a:t>Future of Blockchain</a:t>
             </a:r>
           </a:p>
         </p:txBody>
@@ -16407,7 +16240,7 @@
 </p:sld>
 </file>
 
-<file path=ppt/slides/slide13.xml><?xml version="1.0" encoding="utf-8"?>
+<file path=ppt/slides/slide12.xml><?xml version="1.0" encoding="utf-8"?>
 <p:sld xmlns:a="http://schemas.openxmlformats.org/drawingml/2006/main" xmlns:r="http://schemas.openxmlformats.org/officeDocument/2006/relationships" xmlns:p="http://schemas.openxmlformats.org/presentationml/2006/main">
   <p:cSld>
     <p:spTree>
@@ -16447,7 +16280,7 @@
           <a:p>
             <a:r>
               <a:rPr lang="en-US" dirty="0"/>
-              <a:t>Common uses of Blockchain (Large Data)</a:t>
+              <a:t>Example: Large Data</a:t>
             </a:r>
           </a:p>
         </p:txBody>
@@ -16913,7 +16746,7 @@
 </p:sld>
 </file>
 
-<file path=ppt/slides/slide14.xml><?xml version="1.0" encoding="utf-8"?>
+<file path=ppt/slides/slide13.xml><?xml version="1.0" encoding="utf-8"?>
 <p:sld xmlns:a="http://schemas.openxmlformats.org/drawingml/2006/main" xmlns:r="http://schemas.openxmlformats.org/officeDocument/2006/relationships" xmlns:p="http://schemas.openxmlformats.org/presentationml/2006/main">
   <p:cSld>
     <p:spTree>
@@ -16953,7 +16786,7 @@
           <a:p>
             <a:r>
               <a:rPr lang="en-US" dirty="0"/>
-              <a:t>Common uses of Blockchain (immutability)</a:t>
+              <a:t>Example: immutability (Financial Ledger)</a:t>
             </a:r>
           </a:p>
         </p:txBody>
@@ -17267,7 +17100,7 @@
 </p:sld>
 </file>
 
-<file path=ppt/slides/slide15.xml><?xml version="1.0" encoding="utf-8"?>
+<file path=ppt/slides/slide14.xml><?xml version="1.0" encoding="utf-8"?>
 <p:sld xmlns:a="http://schemas.openxmlformats.org/drawingml/2006/main" xmlns:r="http://schemas.openxmlformats.org/officeDocument/2006/relationships" xmlns:p="http://schemas.openxmlformats.org/presentationml/2006/main">
   <p:cSld>
     <p:spTree>
@@ -17309,7 +17142,7 @@
           <a:p>
             <a:r>
               <a:rPr lang="en-US" dirty="0"/>
-              <a:t>Common uses of Blockchain (Secure transactions)</a:t>
+              <a:t>Example: Secure transactions without central authority</a:t>
             </a:r>
           </a:p>
         </p:txBody>
@@ -17631,7 +17464,7 @@
 </p:sld>
 </file>
 
-<file path=ppt/slides/slide16.xml><?xml version="1.0" encoding="utf-8"?>
+<file path=ppt/slides/slide15.xml><?xml version="1.0" encoding="utf-8"?>
 <p:sld xmlns:a="http://schemas.openxmlformats.org/drawingml/2006/main" xmlns:r="http://schemas.openxmlformats.org/officeDocument/2006/relationships" xmlns:p="http://schemas.openxmlformats.org/presentationml/2006/main">
   <p:cSld>
     <p:spTree>
@@ -17995,7 +17828,7 @@
 </p:sld>
 </file>
 
-<file path=ppt/slides/slide17.xml><?xml version="1.0" encoding="utf-8"?>
+<file path=ppt/slides/slide16.xml><?xml version="1.0" encoding="utf-8"?>
 <p:sld xmlns:a="http://schemas.openxmlformats.org/drawingml/2006/main" xmlns:r="http://schemas.openxmlformats.org/officeDocument/2006/relationships" xmlns:p="http://schemas.openxmlformats.org/presentationml/2006/main">
   <p:cSld>
     <p:spTree>
@@ -18037,7 +17870,7 @@
           <a:p>
             <a:r>
               <a:rPr lang="en-US" dirty="0"/>
-              <a:t>Common uses of Blockchain</a:t>
+              <a:t>Future of Blockchain</a:t>
             </a:r>
           </a:p>
         </p:txBody>
@@ -18356,7 +18189,7 @@
 </p:sld>
 </file>
 
-<file path=ppt/slides/slide18.xml><?xml version="1.0" encoding="utf-8"?>
+<file path=ppt/slides/slide17.xml><?xml version="1.0" encoding="utf-8"?>
 <p:sld xmlns:a="http://schemas.openxmlformats.org/drawingml/2006/main" xmlns:r="http://schemas.openxmlformats.org/officeDocument/2006/relationships" xmlns:p="http://schemas.openxmlformats.org/presentationml/2006/main">
   <p:cSld>
     <p:spTree>
@@ -18456,31 +18289,31 @@
           <a:p>
             <a:r>
               <a:rPr lang="en-US" sz="2400" dirty="0"/>
-              <a:t>Very new development, so monitoring agencies have not developed sufficient standards</a:t>
+              <a:t>Lack of governance due to early stage of technology</a:t>
             </a:r>
           </a:p>
           <a:p>
             <a:r>
               <a:rPr lang="en-US" sz="2400" dirty="0"/>
-              <a:t>Proof of work requires large use of electricity</a:t>
+              <a:t>Proof of work requires vast amount of computing power and electricity</a:t>
             </a:r>
           </a:p>
           <a:p>
             <a:r>
               <a:rPr lang="en-US" sz="2400" dirty="0"/>
-              <a:t>For smaller network of Blockchain, if a single entity holds more than 50% of network nodes, transaction integrity can be affected</a:t>
+              <a:t>Majority stakeholder in mining can alter transactions</a:t>
             </a:r>
           </a:p>
           <a:p>
             <a:r>
               <a:rPr lang="en-US" sz="2400" dirty="0"/>
-              <a:t>Since the transactions are done with public/private key usage, actual entity doing transaction(s) can be hidden (potential misuse for illegal purposes)</a:t>
+              <a:t>Potential misuse for illegal purposes due to ….</a:t>
             </a:r>
           </a:p>
           <a:p>
             <a:r>
               <a:rPr lang="en-US" sz="2400" dirty="0"/>
-              <a:t>Large network makes the speed of transactions slow</a:t>
+              <a:t>Large blockchain makes the speed of transactions slow</a:t>
             </a:r>
           </a:p>
         </p:txBody>
@@ -18776,7 +18609,7 @@
 </p:sld>
 </file>
 
-<file path=ppt/slides/slide19.xml><?xml version="1.0" encoding="utf-8"?>
+<file path=ppt/slides/slide18.xml><?xml version="1.0" encoding="utf-8"?>
 <p:sld xmlns:a="http://schemas.openxmlformats.org/drawingml/2006/main" xmlns:r="http://schemas.openxmlformats.org/officeDocument/2006/relationships" xmlns:p="http://schemas.openxmlformats.org/presentationml/2006/main">
   <p:cSld>
     <p:spTree>
@@ -18816,7 +18649,7 @@
           <a:p>
             <a:r>
               <a:rPr lang="en-US" sz="3600" dirty="0"/>
-              <a:t>Possible uses by us</a:t>
+              <a:t>Relevance to Bessemer</a:t>
             </a:r>
             <a:endParaRPr lang="en-US" dirty="0"/>
           </a:p>
@@ -18847,19 +18680,53 @@
           <a:p>
             <a:r>
               <a:rPr lang="en-US" sz="2400" dirty="0"/>
-              <a:t>May need to participate in public blockchain for settlement processing (Settlement using smart contracts – zero day settlement period)</a:t>
+              <a:t>May need to participate in various public blockchains </a:t>
+            </a:r>
+          </a:p>
+          <a:p>
+            <a:pPr lvl="1"/>
+            <a:r>
+              <a:rPr lang="en-US" sz="2200" dirty="0"/>
+              <a:t>E.g. Zero day settlement using smart contracts</a:t>
             </a:r>
           </a:p>
           <a:p>
             <a:r>
               <a:rPr lang="en-US" sz="2400" dirty="0"/>
-              <a:t>May need to be aware of the crypto positions of our clients</a:t>
+              <a:t>Crypto positions of our clients</a:t>
+            </a:r>
+          </a:p>
+          <a:p>
+            <a:pPr lvl="1"/>
+            <a:r>
+              <a:rPr lang="en-US" sz="2200" dirty="0"/>
+              <a:t>May need to have private blockchain to reflect in our books</a:t>
             </a:r>
           </a:p>
           <a:p>
             <a:r>
               <a:rPr lang="en-US" sz="2400" dirty="0"/>
-              <a:t>Our clients may invest into digital assets and we need to be aware of underlying technology to guard their interests</a:t>
+              <a:t>Speed of getting data to client</a:t>
+            </a:r>
+          </a:p>
+          <a:p>
+            <a:pPr lvl="1"/>
+            <a:r>
+              <a:rPr lang="en-US" sz="2200" dirty="0"/>
+              <a:t>Private blockchain at our regional offices with historical data</a:t>
+            </a:r>
+          </a:p>
+          <a:p>
+            <a:r>
+              <a:rPr lang="en-US" sz="2400" dirty="0"/>
+              <a:t>Our clients may invest into digital assets </a:t>
+            </a:r>
+          </a:p>
+          <a:p>
+            <a:pPr lvl="1"/>
+            <a:r>
+              <a:rPr lang="en-US" sz="2200" dirty="0"/>
+              <a:t>We need to be aware of underlying technology to guard their interests</a:t>
             </a:r>
           </a:p>
         </p:txBody>
@@ -18893,326 +18760,6 @@
     <p:extLst>
       <p:ext uri="{BB962C8B-B14F-4D97-AF65-F5344CB8AC3E}">
         <p14:creationId xmlns:p14="http://schemas.microsoft.com/office/powerpoint/2010/main" val="1911645816"/>
-      </p:ext>
-    </p:extLst>
-  </p:cSld>
-  <p:clrMapOvr>
-    <a:masterClrMapping/>
-  </p:clrMapOvr>
-  <p:timing>
-    <p:tnLst>
-      <p:par>
-        <p:cTn id="1" dur="indefinite" restart="never" nodeType="tmRoot">
-          <p:childTnLst>
-            <p:seq concurrent="1" nextAc="seek">
-              <p:cTn id="2" dur="indefinite" nodeType="mainSeq">
-                <p:childTnLst>
-                  <p:par>
-                    <p:cTn id="3" fill="hold">
-                      <p:stCondLst>
-                        <p:cond delay="indefinite"/>
-                      </p:stCondLst>
-                      <p:childTnLst>
-                        <p:par>
-                          <p:cTn id="4" fill="hold">
-                            <p:stCondLst>
-                              <p:cond delay="0"/>
-                            </p:stCondLst>
-                            <p:childTnLst>
-                              <p:par>
-                                <p:cTn id="5" presetID="1" presetClass="entr" presetSubtype="0" fill="hold" grpId="0" nodeType="clickEffect">
-                                  <p:stCondLst>
-                                    <p:cond delay="0"/>
-                                  </p:stCondLst>
-                                  <p:childTnLst>
-                                    <p:set>
-                                      <p:cBhvr>
-                                        <p:cTn id="6" dur="1" fill="hold">
-                                          <p:stCondLst>
-                                            <p:cond delay="0"/>
-                                          </p:stCondLst>
-                                        </p:cTn>
-                                        <p:tgtEl>
-                                          <p:spTgt spid="3">
-                                            <p:txEl>
-                                              <p:pRg st="0" end="0"/>
-                                            </p:txEl>
-                                          </p:spTgt>
-                                        </p:tgtEl>
-                                        <p:attrNameLst>
-                                          <p:attrName>style.visibility</p:attrName>
-                                        </p:attrNameLst>
-                                      </p:cBhvr>
-                                      <p:to>
-                                        <p:strVal val="visible"/>
-                                      </p:to>
-                                    </p:set>
-                                  </p:childTnLst>
-                                </p:cTn>
-                              </p:par>
-                            </p:childTnLst>
-                          </p:cTn>
-                        </p:par>
-                      </p:childTnLst>
-                    </p:cTn>
-                  </p:par>
-                  <p:par>
-                    <p:cTn id="7" fill="hold">
-                      <p:stCondLst>
-                        <p:cond delay="indefinite"/>
-                      </p:stCondLst>
-                      <p:childTnLst>
-                        <p:par>
-                          <p:cTn id="8" fill="hold">
-                            <p:stCondLst>
-                              <p:cond delay="0"/>
-                            </p:stCondLst>
-                            <p:childTnLst>
-                              <p:par>
-                                <p:cTn id="9" presetID="1" presetClass="entr" presetSubtype="0" fill="hold" grpId="0" nodeType="clickEffect">
-                                  <p:stCondLst>
-                                    <p:cond delay="0"/>
-                                  </p:stCondLst>
-                                  <p:childTnLst>
-                                    <p:set>
-                                      <p:cBhvr>
-                                        <p:cTn id="10" dur="1" fill="hold">
-                                          <p:stCondLst>
-                                            <p:cond delay="0"/>
-                                          </p:stCondLst>
-                                        </p:cTn>
-                                        <p:tgtEl>
-                                          <p:spTgt spid="3">
-                                            <p:txEl>
-                                              <p:pRg st="1" end="1"/>
-                                            </p:txEl>
-                                          </p:spTgt>
-                                        </p:tgtEl>
-                                        <p:attrNameLst>
-                                          <p:attrName>style.visibility</p:attrName>
-                                        </p:attrNameLst>
-                                      </p:cBhvr>
-                                      <p:to>
-                                        <p:strVal val="visible"/>
-                                      </p:to>
-                                    </p:set>
-                                  </p:childTnLst>
-                                </p:cTn>
-                              </p:par>
-                            </p:childTnLst>
-                          </p:cTn>
-                        </p:par>
-                      </p:childTnLst>
-                    </p:cTn>
-                  </p:par>
-                  <p:par>
-                    <p:cTn id="11" fill="hold">
-                      <p:stCondLst>
-                        <p:cond delay="indefinite"/>
-                      </p:stCondLst>
-                      <p:childTnLst>
-                        <p:par>
-                          <p:cTn id="12" fill="hold">
-                            <p:stCondLst>
-                              <p:cond delay="0"/>
-                            </p:stCondLst>
-                            <p:childTnLst>
-                              <p:par>
-                                <p:cTn id="13" presetID="1" presetClass="entr" presetSubtype="0" fill="hold" grpId="0" nodeType="clickEffect">
-                                  <p:stCondLst>
-                                    <p:cond delay="0"/>
-                                  </p:stCondLst>
-                                  <p:childTnLst>
-                                    <p:set>
-                                      <p:cBhvr>
-                                        <p:cTn id="14" dur="1" fill="hold">
-                                          <p:stCondLst>
-                                            <p:cond delay="0"/>
-                                          </p:stCondLst>
-                                        </p:cTn>
-                                        <p:tgtEl>
-                                          <p:spTgt spid="3">
-                                            <p:txEl>
-                                              <p:pRg st="2" end="2"/>
-                                            </p:txEl>
-                                          </p:spTgt>
-                                        </p:tgtEl>
-                                        <p:attrNameLst>
-                                          <p:attrName>style.visibility</p:attrName>
-                                        </p:attrNameLst>
-                                      </p:cBhvr>
-                                      <p:to>
-                                        <p:strVal val="visible"/>
-                                      </p:to>
-                                    </p:set>
-                                  </p:childTnLst>
-                                </p:cTn>
-                              </p:par>
-                            </p:childTnLst>
-                          </p:cTn>
-                        </p:par>
-                      </p:childTnLst>
-                    </p:cTn>
-                  </p:par>
-                </p:childTnLst>
-              </p:cTn>
-              <p:prevCondLst>
-                <p:cond evt="onPrev" delay="0">
-                  <p:tgtEl>
-                    <p:sldTgt/>
-                  </p:tgtEl>
-                </p:cond>
-              </p:prevCondLst>
-              <p:nextCondLst>
-                <p:cond evt="onNext" delay="0">
-                  <p:tgtEl>
-                    <p:sldTgt/>
-                  </p:tgtEl>
-                </p:cond>
-              </p:nextCondLst>
-            </p:seq>
-          </p:childTnLst>
-        </p:cTn>
-      </p:par>
-    </p:tnLst>
-    <p:bldLst>
-      <p:bldP spid="3" grpId="0" uiExpand="1" build="p"/>
-    </p:bldLst>
-  </p:timing>
-</p:sld>
-</file>
-
-<file path=ppt/slides/slide2.xml><?xml version="1.0" encoding="utf-8"?>
-<p:sld xmlns:a="http://schemas.openxmlformats.org/drawingml/2006/main" xmlns:r="http://schemas.openxmlformats.org/officeDocument/2006/relationships" xmlns:p="http://schemas.openxmlformats.org/presentationml/2006/main">
-  <p:cSld>
-    <p:spTree>
-      <p:nvGrpSpPr>
-        <p:cNvPr id="1" name=""/>
-        <p:cNvGrpSpPr/>
-        <p:nvPr/>
-      </p:nvGrpSpPr>
-      <p:grpSpPr>
-        <a:xfrm>
-          <a:off x="0" y="0"/>
-          <a:ext cx="0" cy="0"/>
-          <a:chOff x="0" y="0"/>
-          <a:chExt cx="0" cy="0"/>
-        </a:xfrm>
-      </p:grpSpPr>
-      <p:sp>
-        <p:nvSpPr>
-          <p:cNvPr id="2" name="Title 1">
-            <a:extLst>
-              <a:ext uri="{FF2B5EF4-FFF2-40B4-BE49-F238E27FC236}">
-                <a16:creationId xmlns:a16="http://schemas.microsoft.com/office/drawing/2014/main" id="{5C64B2C0-9825-48CA-B0E3-8BAB8377E75B}"/>
-              </a:ext>
-            </a:extLst>
-          </p:cNvPr>
-          <p:cNvSpPr>
-            <a:spLocks noGrp="1"/>
-          </p:cNvSpPr>
-          <p:nvPr>
-            <p:ph type="title"/>
-          </p:nvPr>
-        </p:nvSpPr>
-        <p:spPr/>
-        <p:txBody>
-          <a:bodyPr/>
-          <a:lstStyle/>
-          <a:p>
-            <a:r>
-              <a:rPr lang="en-US" dirty="0"/>
-              <a:t>What Do I Plan to Cover</a:t>
-            </a:r>
-          </a:p>
-        </p:txBody>
-      </p:sp>
-      <p:sp>
-        <p:nvSpPr>
-          <p:cNvPr id="3" name="Content Placeholder 2">
-            <a:extLst>
-              <a:ext uri="{FF2B5EF4-FFF2-40B4-BE49-F238E27FC236}">
-                <a16:creationId xmlns:a16="http://schemas.microsoft.com/office/drawing/2014/main" id="{E8EACC5E-F238-4A48-AFA2-1211B4267669}"/>
-              </a:ext>
-            </a:extLst>
-          </p:cNvPr>
-          <p:cNvSpPr>
-            <a:spLocks noGrp="1"/>
-          </p:cNvSpPr>
-          <p:nvPr>
-            <p:ph idx="1"/>
-          </p:nvPr>
-        </p:nvSpPr>
-        <p:spPr/>
-        <p:txBody>
-          <a:bodyPr anchor="t">
-            <a:normAutofit/>
-          </a:bodyPr>
-          <a:lstStyle/>
-          <a:p>
-            <a:r>
-              <a:rPr lang="en-US" sz="2800" dirty="0"/>
-              <a:t>General concept of Blockchain</a:t>
-            </a:r>
-          </a:p>
-          <a:p>
-            <a:pPr marL="0" indent="0">
-              <a:buNone/>
-            </a:pPr>
-            <a:r>
-              <a:rPr lang="en-US" sz="2800" dirty="0"/>
-              <a:t>    &amp; How it is implemented</a:t>
-            </a:r>
-          </a:p>
-          <a:p>
-            <a:r>
-              <a:rPr lang="en-US" sz="2800" dirty="0"/>
-              <a:t>Common uses of Blockchain</a:t>
-            </a:r>
-          </a:p>
-          <a:p>
-            <a:r>
-              <a:rPr lang="en-US" sz="2800" dirty="0"/>
-              <a:t>Problems of Blockchain</a:t>
-            </a:r>
-          </a:p>
-          <a:p>
-            <a:r>
-              <a:rPr lang="en-US" sz="2800" dirty="0"/>
-              <a:t>Possible uses by us</a:t>
-            </a:r>
-          </a:p>
-        </p:txBody>
-      </p:sp>
-      <p:sp>
-        <p:nvSpPr>
-          <p:cNvPr id="4" name="Footer Placeholder 3">
-            <a:extLst>
-              <a:ext uri="{FF2B5EF4-FFF2-40B4-BE49-F238E27FC236}">
-                <a16:creationId xmlns:a16="http://schemas.microsoft.com/office/drawing/2014/main" id="{8429974D-6630-4247-ABE4-0A299B500B4C}"/>
-              </a:ext>
-            </a:extLst>
-          </p:cNvPr>
-          <p:cNvSpPr>
-            <a:spLocks noGrp="1"/>
-          </p:cNvSpPr>
-          <p:nvPr>
-            <p:ph type="ftr" sz="quarter" idx="11"/>
-          </p:nvPr>
-        </p:nvSpPr>
-        <p:spPr/>
-        <p:txBody>
-          <a:bodyPr/>
-          <a:lstStyle/>
-          <a:p>
-            <a:endParaRPr lang="en-US"/>
-          </a:p>
-        </p:txBody>
-      </p:sp>
-    </p:spTree>
-    <p:extLst>
-      <p:ext uri="{BB962C8B-B14F-4D97-AF65-F5344CB8AC3E}">
-        <p14:creationId xmlns:p14="http://schemas.microsoft.com/office/powerpoint/2010/main" val="1089123421"/>
       </p:ext>
     </p:extLst>
   </p:cSld>
@@ -19350,33 +18897,15 @@
                                   </p:childTnLst>
                                 </p:cTn>
                               </p:par>
-                            </p:childTnLst>
-                          </p:cTn>
-                        </p:par>
-                      </p:childTnLst>
-                    </p:cTn>
-                  </p:par>
-                  <p:par>
-                    <p:cTn id="13" fill="hold">
-                      <p:stCondLst>
-                        <p:cond delay="indefinite"/>
-                      </p:stCondLst>
-                      <p:childTnLst>
-                        <p:par>
-                          <p:cTn id="14" fill="hold">
-                            <p:stCondLst>
-                              <p:cond delay="0"/>
-                            </p:stCondLst>
-                            <p:childTnLst>
                               <p:par>
-                                <p:cTn id="15" presetID="1" presetClass="entr" presetSubtype="0" fill="hold" grpId="0" nodeType="clickEffect">
+                                <p:cTn id="13" presetID="1" presetClass="entr" presetSubtype="0" fill="hold" grpId="0" nodeType="withEffect">
                                   <p:stCondLst>
                                     <p:cond delay="0"/>
                                   </p:stCondLst>
                                   <p:childTnLst>
                                     <p:set>
                                       <p:cBhvr>
-                                        <p:cTn id="16" dur="1" fill="hold">
+                                        <p:cTn id="14" dur="1" fill="hold">
                                           <p:stCondLst>
                                             <p:cond delay="0"/>
                                           </p:stCondLst>
@@ -19406,19 +18935,50 @@
                     </p:cTn>
                   </p:par>
                   <p:par>
-                    <p:cTn id="17" fill="hold">
+                    <p:cTn id="15" fill="hold">
                       <p:stCondLst>
                         <p:cond delay="indefinite"/>
                       </p:stCondLst>
                       <p:childTnLst>
                         <p:par>
-                          <p:cTn id="18" fill="hold">
+                          <p:cTn id="16" fill="hold">
                             <p:stCondLst>
                               <p:cond delay="0"/>
                             </p:stCondLst>
                             <p:childTnLst>
                               <p:par>
-                                <p:cTn id="19" presetID="1" presetClass="entr" presetSubtype="0" fill="hold" grpId="0" nodeType="clickEffect">
+                                <p:cTn id="17" presetID="1" presetClass="entr" presetSubtype="0" fill="hold" grpId="0" nodeType="clickEffect">
+                                  <p:stCondLst>
+                                    <p:cond delay="0"/>
+                                  </p:stCondLst>
+                                  <p:childTnLst>
+                                    <p:set>
+                                      <p:cBhvr>
+                                        <p:cTn id="18" dur="1" fill="hold">
+                                          <p:stCondLst>
+                                            <p:cond delay="0"/>
+                                          </p:stCondLst>
+                                        </p:cTn>
+                                        <p:tgtEl>
+                                          <p:spTgt spid="3">
+                                            <p:txEl>
+                                              <p:pRg st="4" end="4"/>
+                                            </p:txEl>
+                                          </p:spTgt>
+                                        </p:tgtEl>
+                                        <p:attrNameLst>
+                                          <p:attrName>style.visibility</p:attrName>
+                                        </p:attrNameLst>
+                                      </p:cBhvr>
+                                      <p:to>
+                                        <p:strVal val="visible"/>
+                                      </p:to>
+                                    </p:set>
+                                  </p:childTnLst>
+                                </p:cTn>
+                              </p:par>
+                              <p:par>
+                                <p:cTn id="19" presetID="1" presetClass="entr" presetSubtype="0" fill="hold" grpId="0" nodeType="withEffect">
                                   <p:stCondLst>
                                     <p:cond delay="0"/>
                                   </p:stCondLst>
@@ -19433,7 +18993,87 @@
                                         <p:tgtEl>
                                           <p:spTgt spid="3">
                                             <p:txEl>
-                                              <p:pRg st="4" end="4"/>
+                                              <p:pRg st="5" end="5"/>
+                                            </p:txEl>
+                                          </p:spTgt>
+                                        </p:tgtEl>
+                                        <p:attrNameLst>
+                                          <p:attrName>style.visibility</p:attrName>
+                                        </p:attrNameLst>
+                                      </p:cBhvr>
+                                      <p:to>
+                                        <p:strVal val="visible"/>
+                                      </p:to>
+                                    </p:set>
+                                  </p:childTnLst>
+                                </p:cTn>
+                              </p:par>
+                            </p:childTnLst>
+                          </p:cTn>
+                        </p:par>
+                      </p:childTnLst>
+                    </p:cTn>
+                  </p:par>
+                  <p:par>
+                    <p:cTn id="21" fill="hold">
+                      <p:stCondLst>
+                        <p:cond delay="indefinite"/>
+                      </p:stCondLst>
+                      <p:childTnLst>
+                        <p:par>
+                          <p:cTn id="22" fill="hold">
+                            <p:stCondLst>
+                              <p:cond delay="0"/>
+                            </p:stCondLst>
+                            <p:childTnLst>
+                              <p:par>
+                                <p:cTn id="23" presetID="1" presetClass="entr" presetSubtype="0" fill="hold" grpId="0" nodeType="clickEffect">
+                                  <p:stCondLst>
+                                    <p:cond delay="0"/>
+                                  </p:stCondLst>
+                                  <p:childTnLst>
+                                    <p:set>
+                                      <p:cBhvr>
+                                        <p:cTn id="24" dur="1" fill="hold">
+                                          <p:stCondLst>
+                                            <p:cond delay="0"/>
+                                          </p:stCondLst>
+                                        </p:cTn>
+                                        <p:tgtEl>
+                                          <p:spTgt spid="3">
+                                            <p:txEl>
+                                              <p:pRg st="6" end="6"/>
+                                            </p:txEl>
+                                          </p:spTgt>
+                                        </p:tgtEl>
+                                        <p:attrNameLst>
+                                          <p:attrName>style.visibility</p:attrName>
+                                        </p:attrNameLst>
+                                      </p:cBhvr>
+                                      <p:to>
+                                        <p:strVal val="visible"/>
+                                      </p:to>
+                                    </p:set>
+                                  </p:childTnLst>
+                                </p:cTn>
+                              </p:par>
+                              <p:par>
+                                <p:cTn id="25" presetID="1" presetClass="entr" presetSubtype="0" fill="hold" grpId="0" nodeType="withEffect">
+                                  <p:stCondLst>
+                                    <p:cond delay="0"/>
+                                  </p:stCondLst>
+                                  <p:childTnLst>
+                                    <p:set>
+                                      <p:cBhvr>
+                                        <p:cTn id="26" dur="1" fill="hold">
+                                          <p:stCondLst>
+                                            <p:cond delay="0"/>
+                                          </p:stCondLst>
+                                        </p:cTn>
+                                        <p:tgtEl>
+                                          <p:spTgt spid="3">
+                                            <p:txEl>
+                                              <p:pRg st="7" end="7"/>
                                             </p:txEl>
                                           </p:spTgt>
                                         </p:tgtEl>
@@ -19482,7 +19122,7 @@
 </p:sld>
 </file>
 
-<file path=ppt/slides/slide20.xml><?xml version="1.0" encoding="utf-8"?>
+<file path=ppt/slides/slide19.xml><?xml version="1.0" encoding="utf-8"?>
 <p:sld xmlns:a="http://schemas.openxmlformats.org/drawingml/2006/main" xmlns:r="http://schemas.openxmlformats.org/officeDocument/2006/relationships" xmlns:p="http://schemas.openxmlformats.org/presentationml/2006/main">
   <p:cSld>
     <p:spTree>
@@ -19597,7 +19237,7 @@
 </p:sld>
 </file>
 
-<file path=ppt/slides/slide3.xml><?xml version="1.0" encoding="utf-8"?>
+<file path=ppt/slides/slide2.xml><?xml version="1.0" encoding="utf-8"?>
 <p:sld xmlns:a="http://schemas.openxmlformats.org/drawingml/2006/main" xmlns:r="http://schemas.openxmlformats.org/officeDocument/2006/relationships" xmlns:p="http://schemas.openxmlformats.org/presentationml/2006/main">
   <p:cSld>
     <p:spTree>
@@ -19740,7 +19380,7 @@
 </p:sld>
 </file>
 
-<file path=ppt/slides/slide4.xml><?xml version="1.0" encoding="utf-8"?>
+<file path=ppt/slides/slide3.xml><?xml version="1.0" encoding="utf-8"?>
 <p:sld xmlns:a="http://schemas.openxmlformats.org/drawingml/2006/main" xmlns:r="http://schemas.openxmlformats.org/officeDocument/2006/relationships" xmlns:p="http://schemas.openxmlformats.org/presentationml/2006/main">
   <p:cSld>
     <p:spTree>
@@ -19873,8 +19513,27 @@
               <a:t>hash</a:t>
             </a:r>
             <a:r>
+              <a:rPr lang="en-US" sz="2800" dirty="0">
+                <a:highlight>
+                  <a:srgbClr val="00FFFF"/>
+                </a:highlight>
+              </a:rPr>
+              <a:t> </a:t>
+            </a:r>
+            <a:r>
+              <a:rPr lang="en-US" sz="2800" dirty="0">
+                <a:solidFill>
+                  <a:srgbClr val="FF0000"/>
+                </a:solidFill>
+                <a:highlight>
+                  <a:srgbClr val="00FFFF"/>
+                </a:highlight>
+              </a:rPr>
+              <a:t>of the previous block</a:t>
+            </a:r>
+            <a:r>
               <a:rPr lang="en-US" sz="2800" dirty="0"/>
-              <a:t> of the previous block, a </a:t>
+              <a:t>, a </a:t>
             </a:r>
             <a:r>
               <a:rPr lang="en-US" sz="2800" dirty="0">
@@ -19988,7 +19647,7 @@
 </p:sld>
 </file>
 
-<file path=ppt/slides/slide5.xml><?xml version="1.0" encoding="utf-8"?>
+<file path=ppt/slides/slide4.xml><?xml version="1.0" encoding="utf-8"?>
 <p:sld xmlns:a="http://schemas.openxmlformats.org/drawingml/2006/main" xmlns:r="http://schemas.openxmlformats.org/officeDocument/2006/relationships" xmlns:p="http://schemas.openxmlformats.org/presentationml/2006/main">
   <p:cSld>
     <p:spTree>
@@ -20452,7 +20111,7 @@
 </p:sld>
 </file>
 
-<file path=ppt/slides/slide6.xml><?xml version="1.0" encoding="utf-8"?>
+<file path=ppt/slides/slide5.xml><?xml version="1.0" encoding="utf-8"?>
 <p:sld xmlns:a="http://schemas.openxmlformats.org/drawingml/2006/main" xmlns:r="http://schemas.openxmlformats.org/officeDocument/2006/relationships" xmlns:p="http://schemas.openxmlformats.org/presentationml/2006/main">
   <p:cSld>
     <p:spTree>
@@ -21058,7 +20717,7 @@
 </p:sld>
 </file>
 
-<file path=ppt/slides/slide7.xml><?xml version="1.0" encoding="utf-8"?>
+<file path=ppt/slides/slide6.xml><?xml version="1.0" encoding="utf-8"?>
 <p:sld xmlns:a="http://schemas.openxmlformats.org/drawingml/2006/main" xmlns:r="http://schemas.openxmlformats.org/officeDocument/2006/relationships" xmlns:p="http://schemas.openxmlformats.org/presentationml/2006/main">
   <p:cSld>
     <p:spTree>
@@ -21675,7 +21334,7 @@
 </p:sld>
 </file>
 
-<file path=ppt/slides/slide8.xml><?xml version="1.0" encoding="utf-8"?>
+<file path=ppt/slides/slide7.xml><?xml version="1.0" encoding="utf-8"?>
 <p:sld xmlns:a="http://schemas.openxmlformats.org/drawingml/2006/main" xmlns:r="http://schemas.openxmlformats.org/officeDocument/2006/relationships" xmlns:p="http://schemas.openxmlformats.org/presentationml/2006/main">
   <p:cSld>
     <p:spTree>
@@ -22494,7 +22153,7 @@
 </p:sld>
 </file>
 
-<file path=ppt/slides/slide9.xml><?xml version="1.0" encoding="utf-8"?>
+<file path=ppt/slides/slide8.xml><?xml version="1.0" encoding="utf-8"?>
 <p:sld xmlns:a="http://schemas.openxmlformats.org/drawingml/2006/main" xmlns:r="http://schemas.openxmlformats.org/officeDocument/2006/relationships" xmlns:p="http://schemas.openxmlformats.org/presentationml/2006/main">
   <p:cSld>
     <p:spTree>
@@ -23672,6 +23331,171 @@
       <p:bldP spid="31" grpId="0"/>
     </p:bldLst>
   </p:timing>
+</p:sld>
+</file>
+
+<file path=ppt/slides/slide9.xml><?xml version="1.0" encoding="utf-8"?>
+<p:sld xmlns:a="http://schemas.openxmlformats.org/drawingml/2006/main" xmlns:r="http://schemas.openxmlformats.org/officeDocument/2006/relationships" xmlns:p="http://schemas.openxmlformats.org/presentationml/2006/main">
+  <p:cSld>
+    <p:spTree>
+      <p:nvGrpSpPr>
+        <p:cNvPr id="1" name=""/>
+        <p:cNvGrpSpPr/>
+        <p:nvPr/>
+      </p:nvGrpSpPr>
+      <p:grpSpPr>
+        <a:xfrm>
+          <a:off x="0" y="0"/>
+          <a:ext cx="0" cy="0"/>
+          <a:chOff x="0" y="0"/>
+          <a:chExt cx="0" cy="0"/>
+        </a:xfrm>
+      </p:grpSpPr>
+      <p:sp>
+        <p:nvSpPr>
+          <p:cNvPr id="2" name="Title 1">
+            <a:extLst>
+              <a:ext uri="{FF2B5EF4-FFF2-40B4-BE49-F238E27FC236}">
+                <a16:creationId xmlns:a16="http://schemas.microsoft.com/office/drawing/2014/main" id="{2F8CA95A-2352-4C3C-BB2F-0AF30A641769}"/>
+              </a:ext>
+            </a:extLst>
+          </p:cNvPr>
+          <p:cNvSpPr>
+            <a:spLocks noGrp="1"/>
+          </p:cNvSpPr>
+          <p:nvPr>
+            <p:ph type="title"/>
+          </p:nvPr>
+        </p:nvSpPr>
+        <p:spPr>
+          <a:xfrm>
+            <a:off x="685801" y="383400"/>
+            <a:ext cx="10131425" cy="696686"/>
+          </a:xfrm>
+        </p:spPr>
+        <p:txBody>
+          <a:bodyPr/>
+          <a:lstStyle/>
+          <a:p>
+            <a:r>
+              <a:rPr lang="en-US" dirty="0"/>
+              <a:t>General concept of Blockchain</a:t>
+            </a:r>
+          </a:p>
+        </p:txBody>
+      </p:sp>
+      <p:sp>
+        <p:nvSpPr>
+          <p:cNvPr id="3" name="Content Placeholder 2">
+            <a:extLst>
+              <a:ext uri="{FF2B5EF4-FFF2-40B4-BE49-F238E27FC236}">
+                <a16:creationId xmlns:a16="http://schemas.microsoft.com/office/drawing/2014/main" id="{86A14F35-5599-4413-9392-55743DACF57D}"/>
+              </a:ext>
+            </a:extLst>
+          </p:cNvPr>
+          <p:cNvSpPr>
+            <a:spLocks noGrp="1"/>
+          </p:cNvSpPr>
+          <p:nvPr>
+            <p:ph idx="1"/>
+          </p:nvPr>
+        </p:nvSpPr>
+        <p:spPr>
+          <a:xfrm>
+            <a:off x="685801" y="1080087"/>
+            <a:ext cx="10131425" cy="563184"/>
+          </a:xfrm>
+        </p:spPr>
+        <p:txBody>
+          <a:bodyPr/>
+          <a:lstStyle/>
+          <a:p>
+            <a:r>
+              <a:rPr lang="en-US" dirty="0"/>
+              <a:t>Blockchain is a type of Distributed Ledger Technology</a:t>
+            </a:r>
+          </a:p>
+        </p:txBody>
+      </p:sp>
+      <p:sp>
+        <p:nvSpPr>
+          <p:cNvPr id="4" name="Footer Placeholder 3">
+            <a:extLst>
+              <a:ext uri="{FF2B5EF4-FFF2-40B4-BE49-F238E27FC236}">
+                <a16:creationId xmlns:a16="http://schemas.microsoft.com/office/drawing/2014/main" id="{EFF3A170-42A2-4531-9696-ED1A545EFE91}"/>
+              </a:ext>
+            </a:extLst>
+          </p:cNvPr>
+          <p:cNvSpPr>
+            <a:spLocks noGrp="1"/>
+          </p:cNvSpPr>
+          <p:nvPr>
+            <p:ph type="ftr" sz="quarter" idx="11"/>
+          </p:nvPr>
+        </p:nvSpPr>
+        <p:spPr>
+          <a:xfrm>
+            <a:off x="449451" y="6356350"/>
+            <a:ext cx="11251769" cy="365125"/>
+          </a:xfrm>
+        </p:spPr>
+        <p:txBody>
+          <a:bodyPr/>
+          <a:lstStyle/>
+          <a:p>
+            <a:r>
+              <a:rPr lang="en-US" dirty="0"/>
+              <a:t>https://www.euromoney.com/learning/blockchain-explained/what-is-blockchain</a:t>
+            </a:r>
+          </a:p>
+        </p:txBody>
+      </p:sp>
+      <p:pic>
+        <p:nvPicPr>
+          <p:cNvPr id="6" name="Picture 5">
+            <a:extLst>
+              <a:ext uri="{FF2B5EF4-FFF2-40B4-BE49-F238E27FC236}">
+                <a16:creationId xmlns:a16="http://schemas.microsoft.com/office/drawing/2014/main" id="{EBAD2DA8-7E8C-4B26-8951-72846578A0AE}"/>
+              </a:ext>
+            </a:extLst>
+          </p:cNvPr>
+          <p:cNvPicPr>
+            <a:picLocks noChangeAspect="1"/>
+          </p:cNvPicPr>
+          <p:nvPr/>
+        </p:nvPicPr>
+        <p:blipFill>
+          <a:blip r:embed="rId2">
+            <a:extLst>
+              <a:ext uri="{28A0092B-C50C-407E-A947-70E740481C1C}">
+                <a14:useLocalDpi xmlns:a14="http://schemas.microsoft.com/office/drawing/2010/main" val="0"/>
+              </a:ext>
+            </a:extLst>
+          </a:blip>
+          <a:stretch>
+            <a:fillRect/>
+          </a:stretch>
+        </p:blipFill>
+        <p:spPr>
+          <a:xfrm>
+            <a:off x="2366053" y="1815549"/>
+            <a:ext cx="6607466" cy="4129666"/>
+          </a:xfrm>
+          <a:prstGeom prst="rect">
+            <a:avLst/>
+          </a:prstGeom>
+        </p:spPr>
+      </p:pic>
+    </p:spTree>
+    <p:extLst>
+      <p:ext uri="{BB962C8B-B14F-4D97-AF65-F5344CB8AC3E}">
+        <p14:creationId xmlns:p14="http://schemas.microsoft.com/office/powerpoint/2010/main" val="3561977040"/>
+      </p:ext>
+    </p:extLst>
+  </p:cSld>
+  <p:clrMapOvr>
+    <a:masterClrMapping/>
+  </p:clrMapOvr>
 </p:sld>
 </file>
 

</xml_diff>